<commit_message>
improved DevOpsPipeline diagram with tool names
</commit_message>
<xml_diff>
--- a/starter/DevOpsPipeline.pptx
+++ b/starter/DevOpsPipeline.pptx
@@ -8,7 +8,7 @@
     <p:sldId id="256" r:id="rId3"/>
   </p:sldIdLst>
   <p:sldSz cx="9144000" cy="5143500"/>
-  <p:notesSz cx="6858000" cy="9144000"/>
+  <p:notesSz cx="7559675" cy="10691812"/>
 </p:presentation>
 </file>
 
@@ -53,7 +53,7 @@
       </p:grpSpPr>
       <p:sp>
         <p:nvSpPr>
-          <p:cNvPr id="24" name="PlaceHolder 1"/>
+          <p:cNvPr id="22" name="PlaceHolder 1"/>
           <p:cNvSpPr>
             <a:spLocks noGrp="1"/>
           </p:cNvSpPr>
@@ -64,7 +64,7 @@
         <p:spPr>
           <a:xfrm>
             <a:off x="311760" y="744480"/>
-            <a:ext cx="8520120" cy="2052360"/>
+            <a:ext cx="8519760" cy="2052000"/>
           </a:xfrm>
           <a:prstGeom prst="rect">
             <a:avLst/>
@@ -75,18 +75,16 @@
             <a:noAutofit/>
           </a:bodyPr>
           <a:p>
-            <a:endParaRPr b="0" lang="pl-PL" sz="1400" spc="-1" strike="noStrike">
-              <a:solidFill>
-                <a:srgbClr val="000000"/>
-              </a:solidFill>
-              <a:latin typeface="Arial"/>
-            </a:endParaRPr>
-          </a:p>
-        </p:txBody>
-      </p:sp>
-      <p:sp>
-        <p:nvSpPr>
-          <p:cNvPr id="25" name="PlaceHolder 2"/>
+            <a:pPr algn="ctr"/>
+            <a:endParaRPr b="0" lang="pl-PL" sz="4400" spc="-1" strike="noStrike">
+              <a:latin typeface="Arial"/>
+            </a:endParaRPr>
+          </a:p>
+        </p:txBody>
+      </p:sp>
+      <p:sp>
+        <p:nvSpPr>
+          <p:cNvPr id="23" name="PlaceHolder 2"/>
           <p:cNvSpPr>
             <a:spLocks noGrp="1"/>
           </p:cNvSpPr>
@@ -108,18 +106,15 @@
             <a:normAutofit/>
           </a:bodyPr>
           <a:p>
-            <a:endParaRPr b="0" lang="pl-PL" sz="1400" spc="-1" strike="noStrike">
-              <a:solidFill>
-                <a:srgbClr val="000000"/>
-              </a:solidFill>
-              <a:latin typeface="Arial"/>
-            </a:endParaRPr>
-          </a:p>
-        </p:txBody>
-      </p:sp>
-      <p:sp>
-        <p:nvSpPr>
-          <p:cNvPr id="26" name="PlaceHolder 3"/>
+            <a:endParaRPr b="0" lang="pl-PL" sz="3200" spc="-1" strike="noStrike">
+              <a:latin typeface="Arial"/>
+            </a:endParaRPr>
+          </a:p>
+        </p:txBody>
+      </p:sp>
+      <p:sp>
+        <p:nvSpPr>
+          <p:cNvPr id="24" name="PlaceHolder 3"/>
           <p:cNvSpPr>
             <a:spLocks noGrp="1"/>
           </p:cNvSpPr>
@@ -141,10 +136,7 @@
             <a:normAutofit/>
           </a:bodyPr>
           <a:p>
-            <a:endParaRPr b="0" lang="pl-PL" sz="1400" spc="-1" strike="noStrike">
-              <a:solidFill>
-                <a:srgbClr val="000000"/>
-              </a:solidFill>
+            <a:endParaRPr b="0" lang="pl-PL" sz="3200" spc="-1" strike="noStrike">
               <a:latin typeface="Arial"/>
             </a:endParaRPr>
           </a:p>
@@ -174,7 +166,7 @@
       </p:grpSpPr>
       <p:sp>
         <p:nvSpPr>
-          <p:cNvPr id="27" name="PlaceHolder 1"/>
+          <p:cNvPr id="25" name="PlaceHolder 1"/>
           <p:cNvSpPr>
             <a:spLocks noGrp="1"/>
           </p:cNvSpPr>
@@ -185,7 +177,7 @@
         <p:spPr>
           <a:xfrm>
             <a:off x="311760" y="744480"/>
-            <a:ext cx="8520120" cy="2052360"/>
+            <a:ext cx="8519760" cy="2052000"/>
           </a:xfrm>
           <a:prstGeom prst="rect">
             <a:avLst/>
@@ -196,18 +188,16 @@
             <a:noAutofit/>
           </a:bodyPr>
           <a:p>
-            <a:endParaRPr b="0" lang="pl-PL" sz="1400" spc="-1" strike="noStrike">
-              <a:solidFill>
-                <a:srgbClr val="000000"/>
-              </a:solidFill>
-              <a:latin typeface="Arial"/>
-            </a:endParaRPr>
-          </a:p>
-        </p:txBody>
-      </p:sp>
-      <p:sp>
-        <p:nvSpPr>
-          <p:cNvPr id="28" name="PlaceHolder 2"/>
+            <a:pPr algn="ctr"/>
+            <a:endParaRPr b="0" lang="pl-PL" sz="4400" spc="-1" strike="noStrike">
+              <a:latin typeface="Arial"/>
+            </a:endParaRPr>
+          </a:p>
+        </p:txBody>
+      </p:sp>
+      <p:sp>
+        <p:nvSpPr>
+          <p:cNvPr id="26" name="PlaceHolder 2"/>
           <p:cNvSpPr>
             <a:spLocks noGrp="1"/>
           </p:cNvSpPr>
@@ -229,18 +219,15 @@
             <a:normAutofit/>
           </a:bodyPr>
           <a:p>
-            <a:endParaRPr b="0" lang="pl-PL" sz="1400" spc="-1" strike="noStrike">
-              <a:solidFill>
-                <a:srgbClr val="000000"/>
-              </a:solidFill>
-              <a:latin typeface="Arial"/>
-            </a:endParaRPr>
-          </a:p>
-        </p:txBody>
-      </p:sp>
-      <p:sp>
-        <p:nvSpPr>
-          <p:cNvPr id="29" name="PlaceHolder 3"/>
+            <a:endParaRPr b="0" lang="pl-PL" sz="3200" spc="-1" strike="noStrike">
+              <a:latin typeface="Arial"/>
+            </a:endParaRPr>
+          </a:p>
+        </p:txBody>
+      </p:sp>
+      <p:sp>
+        <p:nvSpPr>
+          <p:cNvPr id="27" name="PlaceHolder 3"/>
           <p:cNvSpPr>
             <a:spLocks noGrp="1"/>
           </p:cNvSpPr>
@@ -262,18 +249,15 @@
             <a:normAutofit/>
           </a:bodyPr>
           <a:p>
-            <a:endParaRPr b="0" lang="pl-PL" sz="1400" spc="-1" strike="noStrike">
-              <a:solidFill>
-                <a:srgbClr val="000000"/>
-              </a:solidFill>
-              <a:latin typeface="Arial"/>
-            </a:endParaRPr>
-          </a:p>
-        </p:txBody>
-      </p:sp>
-      <p:sp>
-        <p:nvSpPr>
-          <p:cNvPr id="30" name="PlaceHolder 4"/>
+            <a:endParaRPr b="0" lang="pl-PL" sz="3200" spc="-1" strike="noStrike">
+              <a:latin typeface="Arial"/>
+            </a:endParaRPr>
+          </a:p>
+        </p:txBody>
+      </p:sp>
+      <p:sp>
+        <p:nvSpPr>
+          <p:cNvPr id="28" name="PlaceHolder 4"/>
           <p:cNvSpPr>
             <a:spLocks noGrp="1"/>
           </p:cNvSpPr>
@@ -295,18 +279,15 @@
             <a:normAutofit/>
           </a:bodyPr>
           <a:p>
-            <a:endParaRPr b="0" lang="pl-PL" sz="1400" spc="-1" strike="noStrike">
-              <a:solidFill>
-                <a:srgbClr val="000000"/>
-              </a:solidFill>
-              <a:latin typeface="Arial"/>
-            </a:endParaRPr>
-          </a:p>
-        </p:txBody>
-      </p:sp>
-      <p:sp>
-        <p:nvSpPr>
-          <p:cNvPr id="31" name="PlaceHolder 5"/>
+            <a:endParaRPr b="0" lang="pl-PL" sz="3200" spc="-1" strike="noStrike">
+              <a:latin typeface="Arial"/>
+            </a:endParaRPr>
+          </a:p>
+        </p:txBody>
+      </p:sp>
+      <p:sp>
+        <p:nvSpPr>
+          <p:cNvPr id="29" name="PlaceHolder 5"/>
           <p:cNvSpPr>
             <a:spLocks noGrp="1"/>
           </p:cNvSpPr>
@@ -328,10 +309,7 @@
             <a:normAutofit/>
           </a:bodyPr>
           <a:p>
-            <a:endParaRPr b="0" lang="pl-PL" sz="1400" spc="-1" strike="noStrike">
-              <a:solidFill>
-                <a:srgbClr val="000000"/>
-              </a:solidFill>
+            <a:endParaRPr b="0" lang="pl-PL" sz="3200" spc="-1" strike="noStrike">
               <a:latin typeface="Arial"/>
             </a:endParaRPr>
           </a:p>
@@ -361,7 +339,7 @@
       </p:grpSpPr>
       <p:sp>
         <p:nvSpPr>
-          <p:cNvPr id="32" name="PlaceHolder 1"/>
+          <p:cNvPr id="30" name="PlaceHolder 1"/>
           <p:cNvSpPr>
             <a:spLocks noGrp="1"/>
           </p:cNvSpPr>
@@ -372,7 +350,7 @@
         <p:spPr>
           <a:xfrm>
             <a:off x="311760" y="744480"/>
-            <a:ext cx="8520120" cy="2052360"/>
+            <a:ext cx="8519760" cy="2052000"/>
           </a:xfrm>
           <a:prstGeom prst="rect">
             <a:avLst/>
@@ -383,18 +361,16 @@
             <a:noAutofit/>
           </a:bodyPr>
           <a:p>
-            <a:endParaRPr b="0" lang="pl-PL" sz="1400" spc="-1" strike="noStrike">
-              <a:solidFill>
-                <a:srgbClr val="000000"/>
-              </a:solidFill>
-              <a:latin typeface="Arial"/>
-            </a:endParaRPr>
-          </a:p>
-        </p:txBody>
-      </p:sp>
-      <p:sp>
-        <p:nvSpPr>
-          <p:cNvPr id="33" name="PlaceHolder 2"/>
+            <a:pPr algn="ctr"/>
+            <a:endParaRPr b="0" lang="pl-PL" sz="4400" spc="-1" strike="noStrike">
+              <a:latin typeface="Arial"/>
+            </a:endParaRPr>
+          </a:p>
+        </p:txBody>
+      </p:sp>
+      <p:sp>
+        <p:nvSpPr>
+          <p:cNvPr id="31" name="PlaceHolder 2"/>
           <p:cNvSpPr>
             <a:spLocks noGrp="1"/>
           </p:cNvSpPr>
@@ -416,18 +392,15 @@
             <a:normAutofit/>
           </a:bodyPr>
           <a:p>
-            <a:endParaRPr b="0" lang="pl-PL" sz="1400" spc="-1" strike="noStrike">
-              <a:solidFill>
-                <a:srgbClr val="000000"/>
-              </a:solidFill>
-              <a:latin typeface="Arial"/>
-            </a:endParaRPr>
-          </a:p>
-        </p:txBody>
-      </p:sp>
-      <p:sp>
-        <p:nvSpPr>
-          <p:cNvPr id="34" name="PlaceHolder 3"/>
+            <a:endParaRPr b="0" lang="pl-PL" sz="3200" spc="-1" strike="noStrike">
+              <a:latin typeface="Arial"/>
+            </a:endParaRPr>
+          </a:p>
+        </p:txBody>
+      </p:sp>
+      <p:sp>
+        <p:nvSpPr>
+          <p:cNvPr id="32" name="PlaceHolder 3"/>
           <p:cNvSpPr>
             <a:spLocks noGrp="1"/>
           </p:cNvSpPr>
@@ -449,18 +422,15 @@
             <a:normAutofit/>
           </a:bodyPr>
           <a:p>
-            <a:endParaRPr b="0" lang="pl-PL" sz="1400" spc="-1" strike="noStrike">
-              <a:solidFill>
-                <a:srgbClr val="000000"/>
-              </a:solidFill>
-              <a:latin typeface="Arial"/>
-            </a:endParaRPr>
-          </a:p>
-        </p:txBody>
-      </p:sp>
-      <p:sp>
-        <p:nvSpPr>
-          <p:cNvPr id="35" name="PlaceHolder 4"/>
+            <a:endParaRPr b="0" lang="pl-PL" sz="3200" spc="-1" strike="noStrike">
+              <a:latin typeface="Arial"/>
+            </a:endParaRPr>
+          </a:p>
+        </p:txBody>
+      </p:sp>
+      <p:sp>
+        <p:nvSpPr>
+          <p:cNvPr id="33" name="PlaceHolder 4"/>
           <p:cNvSpPr>
             <a:spLocks noGrp="1"/>
           </p:cNvSpPr>
@@ -482,18 +452,15 @@
             <a:normAutofit/>
           </a:bodyPr>
           <a:p>
-            <a:endParaRPr b="0" lang="pl-PL" sz="1400" spc="-1" strike="noStrike">
-              <a:solidFill>
-                <a:srgbClr val="000000"/>
-              </a:solidFill>
-              <a:latin typeface="Arial"/>
-            </a:endParaRPr>
-          </a:p>
-        </p:txBody>
-      </p:sp>
-      <p:sp>
-        <p:nvSpPr>
-          <p:cNvPr id="36" name="PlaceHolder 5"/>
+            <a:endParaRPr b="0" lang="pl-PL" sz="3200" spc="-1" strike="noStrike">
+              <a:latin typeface="Arial"/>
+            </a:endParaRPr>
+          </a:p>
+        </p:txBody>
+      </p:sp>
+      <p:sp>
+        <p:nvSpPr>
+          <p:cNvPr id="34" name="PlaceHolder 5"/>
           <p:cNvSpPr>
             <a:spLocks noGrp="1"/>
           </p:cNvSpPr>
@@ -515,18 +482,15 @@
             <a:normAutofit/>
           </a:bodyPr>
           <a:p>
-            <a:endParaRPr b="0" lang="pl-PL" sz="1400" spc="-1" strike="noStrike">
-              <a:solidFill>
-                <a:srgbClr val="000000"/>
-              </a:solidFill>
-              <a:latin typeface="Arial"/>
-            </a:endParaRPr>
-          </a:p>
-        </p:txBody>
-      </p:sp>
-      <p:sp>
-        <p:nvSpPr>
-          <p:cNvPr id="37" name="PlaceHolder 6"/>
+            <a:endParaRPr b="0" lang="pl-PL" sz="3200" spc="-1" strike="noStrike">
+              <a:latin typeface="Arial"/>
+            </a:endParaRPr>
+          </a:p>
+        </p:txBody>
+      </p:sp>
+      <p:sp>
+        <p:nvSpPr>
+          <p:cNvPr id="35" name="PlaceHolder 6"/>
           <p:cNvSpPr>
             <a:spLocks noGrp="1"/>
           </p:cNvSpPr>
@@ -548,18 +512,15 @@
             <a:normAutofit/>
           </a:bodyPr>
           <a:p>
-            <a:endParaRPr b="0" lang="pl-PL" sz="1400" spc="-1" strike="noStrike">
-              <a:solidFill>
-                <a:srgbClr val="000000"/>
-              </a:solidFill>
-              <a:latin typeface="Arial"/>
-            </a:endParaRPr>
-          </a:p>
-        </p:txBody>
-      </p:sp>
-      <p:sp>
-        <p:nvSpPr>
-          <p:cNvPr id="38" name="PlaceHolder 7"/>
+            <a:endParaRPr b="0" lang="pl-PL" sz="3200" spc="-1" strike="noStrike">
+              <a:latin typeface="Arial"/>
+            </a:endParaRPr>
+          </a:p>
+        </p:txBody>
+      </p:sp>
+      <p:sp>
+        <p:nvSpPr>
+          <p:cNvPr id="36" name="PlaceHolder 7"/>
           <p:cNvSpPr>
             <a:spLocks noGrp="1"/>
           </p:cNvSpPr>
@@ -581,10 +542,7 @@
             <a:normAutofit/>
           </a:bodyPr>
           <a:p>
-            <a:endParaRPr b="0" lang="pl-PL" sz="1400" spc="-1" strike="noStrike">
-              <a:solidFill>
-                <a:srgbClr val="000000"/>
-              </a:solidFill>
+            <a:endParaRPr b="0" lang="pl-PL" sz="3200" spc="-1" strike="noStrike">
               <a:latin typeface="Arial"/>
             </a:endParaRPr>
           </a:p>
@@ -614,7 +572,7 @@
       </p:grpSpPr>
       <p:sp>
         <p:nvSpPr>
-          <p:cNvPr id="3" name="PlaceHolder 1"/>
+          <p:cNvPr id="1" name="PlaceHolder 1"/>
           <p:cNvSpPr>
             <a:spLocks noGrp="1"/>
           </p:cNvSpPr>
@@ -625,7 +583,7 @@
         <p:spPr>
           <a:xfrm>
             <a:off x="311760" y="744480"/>
-            <a:ext cx="8520120" cy="2052360"/>
+            <a:ext cx="8519760" cy="2052000"/>
           </a:xfrm>
           <a:prstGeom prst="rect">
             <a:avLst/>
@@ -636,18 +594,16 @@
             <a:noAutofit/>
           </a:bodyPr>
           <a:p>
-            <a:endParaRPr b="0" lang="pl-PL" sz="1400" spc="-1" strike="noStrike">
-              <a:solidFill>
-                <a:srgbClr val="000000"/>
-              </a:solidFill>
-              <a:latin typeface="Arial"/>
-            </a:endParaRPr>
-          </a:p>
-        </p:txBody>
-      </p:sp>
-      <p:sp>
-        <p:nvSpPr>
-          <p:cNvPr id="4" name="PlaceHolder 2"/>
+            <a:pPr algn="ctr"/>
+            <a:endParaRPr b="0" lang="pl-PL" sz="4400" spc="-1" strike="noStrike">
+              <a:latin typeface="Arial"/>
+            </a:endParaRPr>
+          </a:p>
+        </p:txBody>
+      </p:sp>
+      <p:sp>
+        <p:nvSpPr>
+          <p:cNvPr id="2" name="PlaceHolder 2"/>
           <p:cNvSpPr>
             <a:spLocks noGrp="1"/>
           </p:cNvSpPr>
@@ -700,7 +656,7 @@
       </p:grpSpPr>
       <p:sp>
         <p:nvSpPr>
-          <p:cNvPr id="5" name="PlaceHolder 1"/>
+          <p:cNvPr id="3" name="PlaceHolder 1"/>
           <p:cNvSpPr>
             <a:spLocks noGrp="1"/>
           </p:cNvSpPr>
@@ -711,7 +667,7 @@
         <p:spPr>
           <a:xfrm>
             <a:off x="311760" y="744480"/>
-            <a:ext cx="8520120" cy="2052360"/>
+            <a:ext cx="8519760" cy="2052000"/>
           </a:xfrm>
           <a:prstGeom prst="rect">
             <a:avLst/>
@@ -722,18 +678,16 @@
             <a:noAutofit/>
           </a:bodyPr>
           <a:p>
-            <a:endParaRPr b="0" lang="pl-PL" sz="1400" spc="-1" strike="noStrike">
-              <a:solidFill>
-                <a:srgbClr val="000000"/>
-              </a:solidFill>
-              <a:latin typeface="Arial"/>
-            </a:endParaRPr>
-          </a:p>
-        </p:txBody>
-      </p:sp>
-      <p:sp>
-        <p:nvSpPr>
-          <p:cNvPr id="6" name="PlaceHolder 2"/>
+            <a:pPr algn="ctr"/>
+            <a:endParaRPr b="0" lang="pl-PL" sz="4400" spc="-1" strike="noStrike">
+              <a:latin typeface="Arial"/>
+            </a:endParaRPr>
+          </a:p>
+        </p:txBody>
+      </p:sp>
+      <p:sp>
+        <p:nvSpPr>
+          <p:cNvPr id="4" name="PlaceHolder 2"/>
           <p:cNvSpPr>
             <a:spLocks noGrp="1"/>
           </p:cNvSpPr>
@@ -755,10 +709,7 @@
             <a:normAutofit/>
           </a:bodyPr>
           <a:p>
-            <a:endParaRPr b="0" lang="pl-PL" sz="1400" spc="-1" strike="noStrike">
-              <a:solidFill>
-                <a:srgbClr val="000000"/>
-              </a:solidFill>
+            <a:endParaRPr b="0" lang="pl-PL" sz="3200" spc="-1" strike="noStrike">
               <a:latin typeface="Arial"/>
             </a:endParaRPr>
           </a:p>
@@ -788,7 +739,7 @@
       </p:grpSpPr>
       <p:sp>
         <p:nvSpPr>
-          <p:cNvPr id="7" name="PlaceHolder 1"/>
+          <p:cNvPr id="5" name="PlaceHolder 1"/>
           <p:cNvSpPr>
             <a:spLocks noGrp="1"/>
           </p:cNvSpPr>
@@ -799,7 +750,7 @@
         <p:spPr>
           <a:xfrm>
             <a:off x="311760" y="744480"/>
-            <a:ext cx="8520120" cy="2052360"/>
+            <a:ext cx="8519760" cy="2052000"/>
           </a:xfrm>
           <a:prstGeom prst="rect">
             <a:avLst/>
@@ -810,18 +761,16 @@
             <a:noAutofit/>
           </a:bodyPr>
           <a:p>
-            <a:endParaRPr b="0" lang="pl-PL" sz="1400" spc="-1" strike="noStrike">
-              <a:solidFill>
-                <a:srgbClr val="000000"/>
-              </a:solidFill>
-              <a:latin typeface="Arial"/>
-            </a:endParaRPr>
-          </a:p>
-        </p:txBody>
-      </p:sp>
-      <p:sp>
-        <p:nvSpPr>
-          <p:cNvPr id="8" name="PlaceHolder 2"/>
+            <a:pPr algn="ctr"/>
+            <a:endParaRPr b="0" lang="pl-PL" sz="4400" spc="-1" strike="noStrike">
+              <a:latin typeface="Arial"/>
+            </a:endParaRPr>
+          </a:p>
+        </p:txBody>
+      </p:sp>
+      <p:sp>
+        <p:nvSpPr>
+          <p:cNvPr id="6" name="PlaceHolder 2"/>
           <p:cNvSpPr>
             <a:spLocks noGrp="1"/>
           </p:cNvSpPr>
@@ -843,18 +792,15 @@
             <a:normAutofit/>
           </a:bodyPr>
           <a:p>
-            <a:endParaRPr b="0" lang="pl-PL" sz="1400" spc="-1" strike="noStrike">
-              <a:solidFill>
-                <a:srgbClr val="000000"/>
-              </a:solidFill>
-              <a:latin typeface="Arial"/>
-            </a:endParaRPr>
-          </a:p>
-        </p:txBody>
-      </p:sp>
-      <p:sp>
-        <p:nvSpPr>
-          <p:cNvPr id="9" name="PlaceHolder 3"/>
+            <a:endParaRPr b="0" lang="pl-PL" sz="3200" spc="-1" strike="noStrike">
+              <a:latin typeface="Arial"/>
+            </a:endParaRPr>
+          </a:p>
+        </p:txBody>
+      </p:sp>
+      <p:sp>
+        <p:nvSpPr>
+          <p:cNvPr id="7" name="PlaceHolder 3"/>
           <p:cNvSpPr>
             <a:spLocks noGrp="1"/>
           </p:cNvSpPr>
@@ -876,10 +822,7 @@
             <a:normAutofit/>
           </a:bodyPr>
           <a:p>
-            <a:endParaRPr b="0" lang="pl-PL" sz="1400" spc="-1" strike="noStrike">
-              <a:solidFill>
-                <a:srgbClr val="000000"/>
-              </a:solidFill>
+            <a:endParaRPr b="0" lang="pl-PL" sz="3200" spc="-1" strike="noStrike">
               <a:latin typeface="Arial"/>
             </a:endParaRPr>
           </a:p>
@@ -909,7 +852,7 @@
       </p:grpSpPr>
       <p:sp>
         <p:nvSpPr>
-          <p:cNvPr id="10" name="PlaceHolder 1"/>
+          <p:cNvPr id="8" name="PlaceHolder 1"/>
           <p:cNvSpPr>
             <a:spLocks noGrp="1"/>
           </p:cNvSpPr>
@@ -920,7 +863,7 @@
         <p:spPr>
           <a:xfrm>
             <a:off x="311760" y="744480"/>
-            <a:ext cx="8520120" cy="2052360"/>
+            <a:ext cx="8519760" cy="2052000"/>
           </a:xfrm>
           <a:prstGeom prst="rect">
             <a:avLst/>
@@ -931,10 +874,8 @@
             <a:noAutofit/>
           </a:bodyPr>
           <a:p>
-            <a:endParaRPr b="0" lang="pl-PL" sz="1400" spc="-1" strike="noStrike">
-              <a:solidFill>
-                <a:srgbClr val="000000"/>
-              </a:solidFill>
+            <a:pPr algn="ctr"/>
+            <a:endParaRPr b="0" lang="pl-PL" sz="4400" spc="-1" strike="noStrike">
               <a:latin typeface="Arial"/>
             </a:endParaRPr>
           </a:p>
@@ -964,7 +905,7 @@
       </p:grpSpPr>
       <p:sp>
         <p:nvSpPr>
-          <p:cNvPr id="11" name="PlaceHolder 1"/>
+          <p:cNvPr id="9" name="PlaceHolder 1"/>
           <p:cNvSpPr>
             <a:spLocks noGrp="1"/>
           </p:cNvSpPr>
@@ -975,7 +916,7 @@
         <p:spPr>
           <a:xfrm>
             <a:off x="311760" y="744480"/>
-            <a:ext cx="8520120" cy="9514800"/>
+            <a:ext cx="8519760" cy="9513000"/>
           </a:xfrm>
           <a:prstGeom prst="rect">
             <a:avLst/>
@@ -1017,7 +958,7 @@
       </p:grpSpPr>
       <p:sp>
         <p:nvSpPr>
-          <p:cNvPr id="12" name="PlaceHolder 1"/>
+          <p:cNvPr id="10" name="PlaceHolder 1"/>
           <p:cNvSpPr>
             <a:spLocks noGrp="1"/>
           </p:cNvSpPr>
@@ -1028,7 +969,7 @@
         <p:spPr>
           <a:xfrm>
             <a:off x="311760" y="744480"/>
-            <a:ext cx="8520120" cy="2052360"/>
+            <a:ext cx="8519760" cy="2052000"/>
           </a:xfrm>
           <a:prstGeom prst="rect">
             <a:avLst/>
@@ -1039,18 +980,16 @@
             <a:noAutofit/>
           </a:bodyPr>
           <a:p>
-            <a:endParaRPr b="0" lang="pl-PL" sz="1400" spc="-1" strike="noStrike">
-              <a:solidFill>
-                <a:srgbClr val="000000"/>
-              </a:solidFill>
-              <a:latin typeface="Arial"/>
-            </a:endParaRPr>
-          </a:p>
-        </p:txBody>
-      </p:sp>
-      <p:sp>
-        <p:nvSpPr>
-          <p:cNvPr id="13" name="PlaceHolder 2"/>
+            <a:pPr algn="ctr"/>
+            <a:endParaRPr b="0" lang="pl-PL" sz="4400" spc="-1" strike="noStrike">
+              <a:latin typeface="Arial"/>
+            </a:endParaRPr>
+          </a:p>
+        </p:txBody>
+      </p:sp>
+      <p:sp>
+        <p:nvSpPr>
+          <p:cNvPr id="11" name="PlaceHolder 2"/>
           <p:cNvSpPr>
             <a:spLocks noGrp="1"/>
           </p:cNvSpPr>
@@ -1072,18 +1011,15 @@
             <a:normAutofit/>
           </a:bodyPr>
           <a:p>
-            <a:endParaRPr b="0" lang="pl-PL" sz="1400" spc="-1" strike="noStrike">
-              <a:solidFill>
-                <a:srgbClr val="000000"/>
-              </a:solidFill>
-              <a:latin typeface="Arial"/>
-            </a:endParaRPr>
-          </a:p>
-        </p:txBody>
-      </p:sp>
-      <p:sp>
-        <p:nvSpPr>
-          <p:cNvPr id="14" name="PlaceHolder 3"/>
+            <a:endParaRPr b="0" lang="pl-PL" sz="3200" spc="-1" strike="noStrike">
+              <a:latin typeface="Arial"/>
+            </a:endParaRPr>
+          </a:p>
+        </p:txBody>
+      </p:sp>
+      <p:sp>
+        <p:nvSpPr>
+          <p:cNvPr id="12" name="PlaceHolder 3"/>
           <p:cNvSpPr>
             <a:spLocks noGrp="1"/>
           </p:cNvSpPr>
@@ -1105,18 +1041,15 @@
             <a:normAutofit/>
           </a:bodyPr>
           <a:p>
-            <a:endParaRPr b="0" lang="pl-PL" sz="1400" spc="-1" strike="noStrike">
-              <a:solidFill>
-                <a:srgbClr val="000000"/>
-              </a:solidFill>
-              <a:latin typeface="Arial"/>
-            </a:endParaRPr>
-          </a:p>
-        </p:txBody>
-      </p:sp>
-      <p:sp>
-        <p:nvSpPr>
-          <p:cNvPr id="15" name="PlaceHolder 4"/>
+            <a:endParaRPr b="0" lang="pl-PL" sz="3200" spc="-1" strike="noStrike">
+              <a:latin typeface="Arial"/>
+            </a:endParaRPr>
+          </a:p>
+        </p:txBody>
+      </p:sp>
+      <p:sp>
+        <p:nvSpPr>
+          <p:cNvPr id="13" name="PlaceHolder 4"/>
           <p:cNvSpPr>
             <a:spLocks noGrp="1"/>
           </p:cNvSpPr>
@@ -1138,10 +1071,7 @@
             <a:normAutofit/>
           </a:bodyPr>
           <a:p>
-            <a:endParaRPr b="0" lang="pl-PL" sz="1400" spc="-1" strike="noStrike">
-              <a:solidFill>
-                <a:srgbClr val="000000"/>
-              </a:solidFill>
+            <a:endParaRPr b="0" lang="pl-PL" sz="3200" spc="-1" strike="noStrike">
               <a:latin typeface="Arial"/>
             </a:endParaRPr>
           </a:p>
@@ -1171,7 +1101,7 @@
       </p:grpSpPr>
       <p:sp>
         <p:nvSpPr>
-          <p:cNvPr id="16" name="PlaceHolder 1"/>
+          <p:cNvPr id="14" name="PlaceHolder 1"/>
           <p:cNvSpPr>
             <a:spLocks noGrp="1"/>
           </p:cNvSpPr>
@@ -1182,7 +1112,7 @@
         <p:spPr>
           <a:xfrm>
             <a:off x="311760" y="744480"/>
-            <a:ext cx="8520120" cy="2052360"/>
+            <a:ext cx="8519760" cy="2052000"/>
           </a:xfrm>
           <a:prstGeom prst="rect">
             <a:avLst/>
@@ -1193,18 +1123,16 @@
             <a:noAutofit/>
           </a:bodyPr>
           <a:p>
-            <a:endParaRPr b="0" lang="pl-PL" sz="1400" spc="-1" strike="noStrike">
-              <a:solidFill>
-                <a:srgbClr val="000000"/>
-              </a:solidFill>
-              <a:latin typeface="Arial"/>
-            </a:endParaRPr>
-          </a:p>
-        </p:txBody>
-      </p:sp>
-      <p:sp>
-        <p:nvSpPr>
-          <p:cNvPr id="17" name="PlaceHolder 2"/>
+            <a:pPr algn="ctr"/>
+            <a:endParaRPr b="0" lang="pl-PL" sz="4400" spc="-1" strike="noStrike">
+              <a:latin typeface="Arial"/>
+            </a:endParaRPr>
+          </a:p>
+        </p:txBody>
+      </p:sp>
+      <p:sp>
+        <p:nvSpPr>
+          <p:cNvPr id="15" name="PlaceHolder 2"/>
           <p:cNvSpPr>
             <a:spLocks noGrp="1"/>
           </p:cNvSpPr>
@@ -1226,18 +1154,15 @@
             <a:normAutofit/>
           </a:bodyPr>
           <a:p>
-            <a:endParaRPr b="0" lang="pl-PL" sz="1400" spc="-1" strike="noStrike">
-              <a:solidFill>
-                <a:srgbClr val="000000"/>
-              </a:solidFill>
-              <a:latin typeface="Arial"/>
-            </a:endParaRPr>
-          </a:p>
-        </p:txBody>
-      </p:sp>
-      <p:sp>
-        <p:nvSpPr>
-          <p:cNvPr id="18" name="PlaceHolder 3"/>
+            <a:endParaRPr b="0" lang="pl-PL" sz="3200" spc="-1" strike="noStrike">
+              <a:latin typeface="Arial"/>
+            </a:endParaRPr>
+          </a:p>
+        </p:txBody>
+      </p:sp>
+      <p:sp>
+        <p:nvSpPr>
+          <p:cNvPr id="16" name="PlaceHolder 3"/>
           <p:cNvSpPr>
             <a:spLocks noGrp="1"/>
           </p:cNvSpPr>
@@ -1259,18 +1184,15 @@
             <a:normAutofit/>
           </a:bodyPr>
           <a:p>
-            <a:endParaRPr b="0" lang="pl-PL" sz="1400" spc="-1" strike="noStrike">
-              <a:solidFill>
-                <a:srgbClr val="000000"/>
-              </a:solidFill>
-              <a:latin typeface="Arial"/>
-            </a:endParaRPr>
-          </a:p>
-        </p:txBody>
-      </p:sp>
-      <p:sp>
-        <p:nvSpPr>
-          <p:cNvPr id="19" name="PlaceHolder 4"/>
+            <a:endParaRPr b="0" lang="pl-PL" sz="3200" spc="-1" strike="noStrike">
+              <a:latin typeface="Arial"/>
+            </a:endParaRPr>
+          </a:p>
+        </p:txBody>
+      </p:sp>
+      <p:sp>
+        <p:nvSpPr>
+          <p:cNvPr id="17" name="PlaceHolder 4"/>
           <p:cNvSpPr>
             <a:spLocks noGrp="1"/>
           </p:cNvSpPr>
@@ -1292,10 +1214,7 @@
             <a:normAutofit/>
           </a:bodyPr>
           <a:p>
-            <a:endParaRPr b="0" lang="pl-PL" sz="1400" spc="-1" strike="noStrike">
-              <a:solidFill>
-                <a:srgbClr val="000000"/>
-              </a:solidFill>
+            <a:endParaRPr b="0" lang="pl-PL" sz="3200" spc="-1" strike="noStrike">
               <a:latin typeface="Arial"/>
             </a:endParaRPr>
           </a:p>
@@ -1325,7 +1244,7 @@
       </p:grpSpPr>
       <p:sp>
         <p:nvSpPr>
-          <p:cNvPr id="20" name="PlaceHolder 1"/>
+          <p:cNvPr id="18" name="PlaceHolder 1"/>
           <p:cNvSpPr>
             <a:spLocks noGrp="1"/>
           </p:cNvSpPr>
@@ -1336,7 +1255,7 @@
         <p:spPr>
           <a:xfrm>
             <a:off x="311760" y="744480"/>
-            <a:ext cx="8520120" cy="2052360"/>
+            <a:ext cx="8519760" cy="2052000"/>
           </a:xfrm>
           <a:prstGeom prst="rect">
             <a:avLst/>
@@ -1347,18 +1266,16 @@
             <a:noAutofit/>
           </a:bodyPr>
           <a:p>
-            <a:endParaRPr b="0" lang="pl-PL" sz="1400" spc="-1" strike="noStrike">
-              <a:solidFill>
-                <a:srgbClr val="000000"/>
-              </a:solidFill>
-              <a:latin typeface="Arial"/>
-            </a:endParaRPr>
-          </a:p>
-        </p:txBody>
-      </p:sp>
-      <p:sp>
-        <p:nvSpPr>
-          <p:cNvPr id="21" name="PlaceHolder 2"/>
+            <a:pPr algn="ctr"/>
+            <a:endParaRPr b="0" lang="pl-PL" sz="4400" spc="-1" strike="noStrike">
+              <a:latin typeface="Arial"/>
+            </a:endParaRPr>
+          </a:p>
+        </p:txBody>
+      </p:sp>
+      <p:sp>
+        <p:nvSpPr>
+          <p:cNvPr id="19" name="PlaceHolder 2"/>
           <p:cNvSpPr>
             <a:spLocks noGrp="1"/>
           </p:cNvSpPr>
@@ -1380,18 +1297,15 @@
             <a:normAutofit/>
           </a:bodyPr>
           <a:p>
-            <a:endParaRPr b="0" lang="pl-PL" sz="1400" spc="-1" strike="noStrike">
-              <a:solidFill>
-                <a:srgbClr val="000000"/>
-              </a:solidFill>
-              <a:latin typeface="Arial"/>
-            </a:endParaRPr>
-          </a:p>
-        </p:txBody>
-      </p:sp>
-      <p:sp>
-        <p:nvSpPr>
-          <p:cNvPr id="22" name="PlaceHolder 3"/>
+            <a:endParaRPr b="0" lang="pl-PL" sz="3200" spc="-1" strike="noStrike">
+              <a:latin typeface="Arial"/>
+            </a:endParaRPr>
+          </a:p>
+        </p:txBody>
+      </p:sp>
+      <p:sp>
+        <p:nvSpPr>
+          <p:cNvPr id="20" name="PlaceHolder 3"/>
           <p:cNvSpPr>
             <a:spLocks noGrp="1"/>
           </p:cNvSpPr>
@@ -1413,18 +1327,15 @@
             <a:normAutofit/>
           </a:bodyPr>
           <a:p>
-            <a:endParaRPr b="0" lang="pl-PL" sz="1400" spc="-1" strike="noStrike">
-              <a:solidFill>
-                <a:srgbClr val="000000"/>
-              </a:solidFill>
-              <a:latin typeface="Arial"/>
-            </a:endParaRPr>
-          </a:p>
-        </p:txBody>
-      </p:sp>
-      <p:sp>
-        <p:nvSpPr>
-          <p:cNvPr id="23" name="PlaceHolder 4"/>
+            <a:endParaRPr b="0" lang="pl-PL" sz="3200" spc="-1" strike="noStrike">
+              <a:latin typeface="Arial"/>
+            </a:endParaRPr>
+          </a:p>
+        </p:txBody>
+      </p:sp>
+      <p:sp>
+        <p:nvSpPr>
+          <p:cNvPr id="21" name="PlaceHolder 4"/>
           <p:cNvSpPr>
             <a:spLocks noGrp="1"/>
           </p:cNvSpPr>
@@ -1446,10 +1357,7 @@
             <a:normAutofit/>
           </a:bodyPr>
           <a:p>
-            <a:endParaRPr b="0" lang="pl-PL" sz="1400" spc="-1" strike="noStrike">
-              <a:solidFill>
-                <a:srgbClr val="000000"/>
-              </a:solidFill>
+            <a:endParaRPr b="0" lang="pl-PL" sz="3200" spc="-1" strike="noStrike">
               <a:latin typeface="Arial"/>
             </a:endParaRPr>
           </a:p>
@@ -1497,297 +1405,25 @@
         <p:spPr>
           <a:xfrm>
             <a:off x="311760" y="744480"/>
-            <a:ext cx="8520120" cy="2052360"/>
-          </a:xfrm>
-          <a:prstGeom prst="rect">
-            <a:avLst/>
-          </a:prstGeom>
-        </p:spPr>
-        <p:txBody>
-          <a:bodyPr tIns="91440" bIns="91440" anchor="b">
+            <a:ext cx="8519760" cy="2052000"/>
+          </a:xfrm>
+          <a:prstGeom prst="rect">
+            <a:avLst/>
+          </a:prstGeom>
+        </p:spPr>
+        <p:txBody>
+          <a:bodyPr lIns="0" rIns="0" tIns="0" bIns="0" anchor="ctr">
             <a:noAutofit/>
           </a:bodyPr>
           <a:p>
             <a:pPr algn="ctr"/>
             <a:r>
-              <a:rPr b="0" lang="pl-PL" sz="5200" spc="-1" strike="noStrike">
-                <a:solidFill>
-                  <a:srgbClr val="000000"/>
-                </a:solidFill>
+              <a:rPr b="0" lang="pl-PL" sz="1800" spc="-1" strike="noStrike">
                 <a:latin typeface="Arial"/>
               </a:rPr>
               <a:t>Kliknij, aby edytować format tekstu tytułu</a:t>
             </a:r>
-            <a:endParaRPr b="0" lang="pl-PL" sz="5200" spc="-1" strike="noStrike">
-              <a:solidFill>
-                <a:srgbClr val="000000"/>
-              </a:solidFill>
-              <a:latin typeface="Arial"/>
-            </a:endParaRPr>
-          </a:p>
-        </p:txBody>
-      </p:sp>
-      <p:sp>
-        <p:nvSpPr>
-          <p:cNvPr id="1" name="PlaceHolder 2"/>
-          <p:cNvSpPr>
-            <a:spLocks noGrp="1"/>
-          </p:cNvSpPr>
-          <p:nvPr>
-            <p:ph type="sldNum"/>
-          </p:nvPr>
-        </p:nvSpPr>
-        <p:spPr>
-          <a:xfrm>
-            <a:off x="8472600" y="4663080"/>
-            <a:ext cx="548280" cy="393120"/>
-          </a:xfrm>
-          <a:prstGeom prst="rect">
-            <a:avLst/>
-          </a:prstGeom>
-        </p:spPr>
-        <p:txBody>
-          <a:bodyPr tIns="91440" bIns="91440" anchor="ctr">
-            <a:noAutofit/>
-          </a:bodyPr>
-          <a:p>
-            <a:pPr algn="r">
-              <a:lnSpc>
-                <a:spcPct val="100000"/>
-              </a:lnSpc>
-            </a:pPr>
-            <a:fld id="{94CB9330-5C80-45A9-B2B3-AA6BB9935A84}" type="slidenum">
-              <a:rPr b="0" lang="en" sz="1000" spc="-1" strike="noStrike">
-                <a:solidFill>
-                  <a:srgbClr val="595959"/>
-                </a:solidFill>
-                <a:latin typeface="Arial"/>
-                <a:ea typeface="Arial"/>
-              </a:rPr>
-              <a:t>&lt;numer&gt;</a:t>
-            </a:fld>
-            <a:endParaRPr b="0" lang="pl-PL" sz="1000" spc="-1" strike="noStrike">
-              <a:latin typeface="Times New Roman"/>
-            </a:endParaRPr>
-          </a:p>
-        </p:txBody>
-      </p:sp>
-      <p:sp>
-        <p:nvSpPr>
-          <p:cNvPr id="2" name="PlaceHolder 3"/>
-          <p:cNvSpPr>
-            <a:spLocks noGrp="1"/>
-          </p:cNvSpPr>
-          <p:nvPr>
-            <p:ph type="body"/>
-          </p:nvPr>
-        </p:nvSpPr>
-        <p:spPr>
-          <a:xfrm>
-            <a:off x="457200" y="1203480"/>
-            <a:ext cx="8229240" cy="2982960"/>
-          </a:xfrm>
-          <a:prstGeom prst="rect">
-            <a:avLst/>
-          </a:prstGeom>
-        </p:spPr>
-        <p:txBody>
-          <a:bodyPr lIns="0" rIns="0" tIns="0" bIns="0">
-            <a:normAutofit/>
-          </a:bodyPr>
-          <a:p>
-            <a:pPr marL="432000" indent="-324000">
-              <a:spcBef>
-                <a:spcPts val="1417"/>
-              </a:spcBef>
-              <a:buClr>
-                <a:srgbClr val="000000"/>
-              </a:buClr>
-              <a:buSzPct val="45000"/>
-              <a:buFont typeface="Wingdings" charset="2"/>
-              <a:buChar char=""/>
-            </a:pPr>
-            <a:r>
-              <a:rPr b="0" lang="pl-PL" sz="1400" spc="-1" strike="noStrike">
-                <a:solidFill>
-                  <a:srgbClr val="000000"/>
-                </a:solidFill>
-                <a:latin typeface="Arial"/>
-              </a:rPr>
-              <a:t>Kliknij, aby edytować format tekstu konspektu</a:t>
-            </a:r>
-            <a:endParaRPr b="0" lang="pl-PL" sz="1400" spc="-1" strike="noStrike">
-              <a:solidFill>
-                <a:srgbClr val="000000"/>
-              </a:solidFill>
-              <a:latin typeface="Arial"/>
-            </a:endParaRPr>
-          </a:p>
-          <a:p>
-            <a:pPr lvl="1" marL="864000" indent="-324000">
-              <a:spcBef>
-                <a:spcPts val="1134"/>
-              </a:spcBef>
-              <a:buClr>
-                <a:srgbClr val="000000"/>
-              </a:buClr>
-              <a:buSzPct val="75000"/>
-              <a:buFont typeface="Symbol" charset="2"/>
-              <a:buChar char=""/>
-            </a:pPr>
-            <a:r>
-              <a:rPr b="0" lang="pl-PL" sz="1400" spc="-1" strike="noStrike">
-                <a:solidFill>
-                  <a:srgbClr val="000000"/>
-                </a:solidFill>
-                <a:latin typeface="Arial"/>
-              </a:rPr>
-              <a:t>Drugi poziom konspektu</a:t>
-            </a:r>
-            <a:endParaRPr b="0" lang="pl-PL" sz="1400" spc="-1" strike="noStrike">
-              <a:solidFill>
-                <a:srgbClr val="000000"/>
-              </a:solidFill>
-              <a:latin typeface="Arial"/>
-            </a:endParaRPr>
-          </a:p>
-          <a:p>
-            <a:pPr lvl="2" marL="1296000" indent="-288000">
-              <a:spcBef>
-                <a:spcPts val="850"/>
-              </a:spcBef>
-              <a:buClr>
-                <a:srgbClr val="000000"/>
-              </a:buClr>
-              <a:buSzPct val="45000"/>
-              <a:buFont typeface="Wingdings" charset="2"/>
-              <a:buChar char=""/>
-            </a:pPr>
-            <a:r>
-              <a:rPr b="0" lang="pl-PL" sz="1400" spc="-1" strike="noStrike">
-                <a:solidFill>
-                  <a:srgbClr val="000000"/>
-                </a:solidFill>
-                <a:latin typeface="Arial"/>
-              </a:rPr>
-              <a:t>Trzeci poziom konspektu</a:t>
-            </a:r>
-            <a:endParaRPr b="0" lang="pl-PL" sz="1400" spc="-1" strike="noStrike">
-              <a:solidFill>
-                <a:srgbClr val="000000"/>
-              </a:solidFill>
-              <a:latin typeface="Arial"/>
-            </a:endParaRPr>
-          </a:p>
-          <a:p>
-            <a:pPr lvl="3" marL="1728000" indent="-216000">
-              <a:spcBef>
-                <a:spcPts val="567"/>
-              </a:spcBef>
-              <a:buClr>
-                <a:srgbClr val="000000"/>
-              </a:buClr>
-              <a:buSzPct val="75000"/>
-              <a:buFont typeface="Symbol" charset="2"/>
-              <a:buChar char=""/>
-            </a:pPr>
-            <a:r>
-              <a:rPr b="0" lang="pl-PL" sz="1400" spc="-1" strike="noStrike">
-                <a:solidFill>
-                  <a:srgbClr val="000000"/>
-                </a:solidFill>
-                <a:latin typeface="Arial"/>
-              </a:rPr>
-              <a:t>Czwarty poziom konspektu</a:t>
-            </a:r>
-            <a:endParaRPr b="0" lang="pl-PL" sz="1400" spc="-1" strike="noStrike">
-              <a:solidFill>
-                <a:srgbClr val="000000"/>
-              </a:solidFill>
-              <a:latin typeface="Arial"/>
-            </a:endParaRPr>
-          </a:p>
-          <a:p>
-            <a:pPr lvl="4" marL="2160000" indent="-216000">
-              <a:spcBef>
-                <a:spcPts val="283"/>
-              </a:spcBef>
-              <a:buClr>
-                <a:srgbClr val="000000"/>
-              </a:buClr>
-              <a:buSzPct val="45000"/>
-              <a:buFont typeface="Wingdings" charset="2"/>
-              <a:buChar char=""/>
-            </a:pPr>
-            <a:r>
-              <a:rPr b="0" lang="pl-PL" sz="2000" spc="-1" strike="noStrike">
-                <a:solidFill>
-                  <a:srgbClr val="000000"/>
-                </a:solidFill>
-                <a:latin typeface="Arial"/>
-              </a:rPr>
-              <a:t>Piąty poziom konspektu</a:t>
-            </a:r>
-            <a:endParaRPr b="0" lang="pl-PL" sz="2000" spc="-1" strike="noStrike">
-              <a:solidFill>
-                <a:srgbClr val="000000"/>
-              </a:solidFill>
-              <a:latin typeface="Arial"/>
-            </a:endParaRPr>
-          </a:p>
-          <a:p>
-            <a:pPr lvl="5" marL="2592000" indent="-216000">
-              <a:spcBef>
-                <a:spcPts val="283"/>
-              </a:spcBef>
-              <a:buClr>
-                <a:srgbClr val="000000"/>
-              </a:buClr>
-              <a:buSzPct val="45000"/>
-              <a:buFont typeface="Wingdings" charset="2"/>
-              <a:buChar char=""/>
-            </a:pPr>
-            <a:r>
-              <a:rPr b="0" lang="pl-PL" sz="2000" spc="-1" strike="noStrike">
-                <a:solidFill>
-                  <a:srgbClr val="000000"/>
-                </a:solidFill>
-                <a:latin typeface="Arial"/>
-              </a:rPr>
-              <a:t>Szósty poziom konspektu</a:t>
-            </a:r>
-            <a:endParaRPr b="0" lang="pl-PL" sz="2000" spc="-1" strike="noStrike">
-              <a:solidFill>
-                <a:srgbClr val="000000"/>
-              </a:solidFill>
-              <a:latin typeface="Arial"/>
-            </a:endParaRPr>
-          </a:p>
-          <a:p>
-            <a:pPr lvl="6" marL="3024000" indent="-216000">
-              <a:spcBef>
-                <a:spcPts val="283"/>
-              </a:spcBef>
-              <a:buClr>
-                <a:srgbClr val="000000"/>
-              </a:buClr>
-              <a:buSzPct val="45000"/>
-              <a:buFont typeface="Wingdings" charset="2"/>
-              <a:buChar char=""/>
-            </a:pPr>
-            <a:r>
-              <a:rPr b="0" lang="pl-PL" sz="2000" spc="-1" strike="noStrike">
-                <a:solidFill>
-                  <a:srgbClr val="000000"/>
-                </a:solidFill>
-                <a:latin typeface="Arial"/>
-              </a:rPr>
-              <a:t>Siódmy poziom konspektu</a:t>
-            </a:r>
-            <a:endParaRPr b="0" lang="pl-PL" sz="2000" spc="-1" strike="noStrike">
-              <a:solidFill>
-                <a:srgbClr val="000000"/>
-              </a:solidFill>
+            <a:endParaRPr b="0" lang="pl-PL" sz="1800" spc="-1" strike="noStrike">
               <a:latin typeface="Arial"/>
             </a:endParaRPr>
           </a:p>
@@ -1832,14 +1468,14 @@
       </p:grpSpPr>
       <p:sp>
         <p:nvSpPr>
-          <p:cNvPr id="39" name="CustomShape 1"/>
+          <p:cNvPr id="37" name="CustomShape 1"/>
           <p:cNvSpPr/>
           <p:nvPr/>
         </p:nvSpPr>
         <p:spPr>
           <a:xfrm>
             <a:off x="2094840" y="1985040"/>
-            <a:ext cx="929160" cy="424440"/>
+            <a:ext cx="928800" cy="424080"/>
           </a:xfrm>
           <a:prstGeom prst="rect">
             <a:avLst/>
@@ -1858,7 +1494,7 @@
           <a:fontRef idx="minor"/>
         </p:style>
         <p:txBody>
-          <a:bodyPr tIns="91440" bIns="91440" anchor="ctr">
+          <a:bodyPr lIns="90000" rIns="90000" tIns="91440" bIns="91440" anchor="ctr">
             <a:noAutofit/>
           </a:bodyPr>
           <a:p>
@@ -1885,14 +1521,14 @@
       </p:sp>
       <p:sp>
         <p:nvSpPr>
-          <p:cNvPr id="40" name="CustomShape 2"/>
+          <p:cNvPr id="38" name="CustomShape 2"/>
           <p:cNvSpPr/>
           <p:nvPr/>
         </p:nvSpPr>
         <p:spPr>
           <a:xfrm>
             <a:off x="7672320" y="1872000"/>
-            <a:ext cx="1183680" cy="576000"/>
+            <a:ext cx="1183320" cy="575640"/>
           </a:xfrm>
           <a:prstGeom prst="rect">
             <a:avLst/>
@@ -1911,7 +1547,7 @@
           <a:fontRef idx="minor"/>
         </p:style>
         <p:txBody>
-          <a:bodyPr tIns="91440" bIns="91440" anchor="ctr">
+          <a:bodyPr lIns="90000" rIns="90000" tIns="91440" bIns="91440" anchor="ctr">
             <a:noAutofit/>
           </a:bodyPr>
           <a:p>
@@ -1938,14 +1574,14 @@
       </p:sp>
       <p:sp>
         <p:nvSpPr>
-          <p:cNvPr id="41" name="CustomShape 3"/>
+          <p:cNvPr id="39" name="CustomShape 3"/>
           <p:cNvSpPr/>
           <p:nvPr/>
         </p:nvSpPr>
         <p:spPr>
           <a:xfrm>
             <a:off x="4807440" y="1981080"/>
-            <a:ext cx="929160" cy="424440"/>
+            <a:ext cx="928800" cy="424080"/>
           </a:xfrm>
           <a:prstGeom prst="rect">
             <a:avLst/>
@@ -1964,7 +1600,7 @@
           <a:fontRef idx="minor"/>
         </p:style>
         <p:txBody>
-          <a:bodyPr tIns="91440" bIns="91440" anchor="ctr">
+          <a:bodyPr lIns="90000" rIns="90000" tIns="91440" bIns="91440" anchor="ctr">
             <a:noAutofit/>
           </a:bodyPr>
           <a:p>
@@ -1991,14 +1627,14 @@
       </p:sp>
       <p:sp>
         <p:nvSpPr>
-          <p:cNvPr id="42" name="CustomShape 4"/>
+          <p:cNvPr id="40" name="CustomShape 4"/>
           <p:cNvSpPr/>
           <p:nvPr/>
         </p:nvSpPr>
         <p:spPr>
           <a:xfrm>
             <a:off x="572040" y="1603440"/>
-            <a:ext cx="929160" cy="424440"/>
+            <a:ext cx="928800" cy="424080"/>
           </a:xfrm>
           <a:prstGeom prst="rect">
             <a:avLst/>
@@ -2017,7 +1653,7 @@
           <a:fontRef idx="minor"/>
         </p:style>
         <p:txBody>
-          <a:bodyPr tIns="91440" bIns="91440" anchor="ctr">
+          <a:bodyPr lIns="90000" rIns="90000" tIns="91440" bIns="91440" anchor="ctr">
             <a:noAutofit/>
           </a:bodyPr>
           <a:p>
@@ -2044,14 +1680,14 @@
       </p:sp>
       <p:sp>
         <p:nvSpPr>
-          <p:cNvPr id="43" name="CustomShape 5"/>
+          <p:cNvPr id="41" name="CustomShape 5"/>
           <p:cNvSpPr/>
           <p:nvPr/>
         </p:nvSpPr>
         <p:spPr>
           <a:xfrm>
             <a:off x="572040" y="2383560"/>
-            <a:ext cx="929160" cy="424440"/>
+            <a:ext cx="928800" cy="424080"/>
           </a:xfrm>
           <a:prstGeom prst="rect">
             <a:avLst/>
@@ -2070,7 +1706,7 @@
           <a:fontRef idx="minor"/>
         </p:style>
         <p:txBody>
-          <a:bodyPr tIns="91440" bIns="91440" anchor="ctr">
+          <a:bodyPr lIns="90000" rIns="90000" tIns="91440" bIns="91440" anchor="ctr">
             <a:noAutofit/>
           </a:bodyPr>
           <a:p>
@@ -2097,14 +1733,14 @@
       </p:sp>
       <p:sp>
         <p:nvSpPr>
-          <p:cNvPr id="44" name="CustomShape 6"/>
+          <p:cNvPr id="42" name="CustomShape 6"/>
           <p:cNvSpPr/>
           <p:nvPr/>
         </p:nvSpPr>
         <p:spPr>
           <a:xfrm>
             <a:off x="1501200" y="1815840"/>
-            <a:ext cx="1058040" cy="168840"/>
+            <a:ext cx="1057680" cy="168480"/>
           </a:xfrm>
           <a:prstGeom prst="bentConnector2">
             <a:avLst/>
@@ -2127,14 +1763,14 @@
       </p:sp>
       <p:sp>
         <p:nvSpPr>
-          <p:cNvPr id="45" name="CustomShape 7"/>
+          <p:cNvPr id="43" name="CustomShape 7"/>
           <p:cNvSpPr/>
           <p:nvPr/>
         </p:nvSpPr>
         <p:spPr>
           <a:xfrm flipH="1" rot="10800000">
-            <a:off x="1511640" y="2405880"/>
-            <a:ext cx="3760200" cy="186120"/>
+            <a:off x="1512000" y="2406240"/>
+            <a:ext cx="3759840" cy="185760"/>
           </a:xfrm>
           <a:prstGeom prst="bentConnector2">
             <a:avLst/>
@@ -2157,14 +1793,14 @@
       </p:sp>
       <p:sp>
         <p:nvSpPr>
-          <p:cNvPr id="46" name="CustomShape 8"/>
+          <p:cNvPr id="44" name="CustomShape 8"/>
           <p:cNvSpPr/>
           <p:nvPr/>
         </p:nvSpPr>
         <p:spPr>
           <a:xfrm>
             <a:off x="4457160" y="2193480"/>
-            <a:ext cx="350280" cy="360"/>
+            <a:ext cx="349920" cy="360"/>
           </a:xfrm>
           <a:prstGeom prst="bentConnector3">
             <a:avLst>
@@ -2189,14 +1825,14 @@
       </p:sp>
       <p:sp>
         <p:nvSpPr>
-          <p:cNvPr id="47" name="CustomShape 9"/>
+          <p:cNvPr id="45" name="CustomShape 9"/>
           <p:cNvSpPr/>
           <p:nvPr/>
         </p:nvSpPr>
         <p:spPr>
           <a:xfrm>
             <a:off x="7272000" y="2156400"/>
-            <a:ext cx="400320" cy="360"/>
+            <a:ext cx="399960" cy="360"/>
           </a:xfrm>
           <a:prstGeom prst="bentConnector3">
             <a:avLst>
@@ -2221,14 +1857,14 @@
       </p:sp>
       <p:sp>
         <p:nvSpPr>
-          <p:cNvPr id="48" name="CustomShape 10"/>
+          <p:cNvPr id="46" name="CustomShape 10"/>
           <p:cNvSpPr/>
           <p:nvPr/>
         </p:nvSpPr>
         <p:spPr>
           <a:xfrm>
             <a:off x="3528000" y="1981440"/>
-            <a:ext cx="929160" cy="424440"/>
+            <a:ext cx="928800" cy="424080"/>
           </a:xfrm>
           <a:prstGeom prst="rect">
             <a:avLst/>
@@ -2247,7 +1883,7 @@
           <a:fontRef idx="minor"/>
         </p:style>
         <p:txBody>
-          <a:bodyPr tIns="91440" bIns="91440" anchor="ctr">
+          <a:bodyPr lIns="90000" rIns="90000" tIns="91440" bIns="91440" anchor="ctr">
             <a:noAutofit/>
           </a:bodyPr>
           <a:p>
@@ -2264,7 +1900,7 @@
                 <a:latin typeface="Arial"/>
                 <a:ea typeface="Arial"/>
               </a:rPr>
-              <a:t>AMI security scan</a:t>
+              <a:t>AMI security scan - Dagda</a:t>
             </a:r>
             <a:endParaRPr b="0" lang="pl-PL" sz="800" spc="-1" strike="noStrike">
               <a:latin typeface="Arial"/>
@@ -2274,14 +1910,14 @@
       </p:sp>
       <p:sp>
         <p:nvSpPr>
-          <p:cNvPr id="49" name="CustomShape 11"/>
+          <p:cNvPr id="47" name="CustomShape 11"/>
           <p:cNvSpPr/>
           <p:nvPr/>
         </p:nvSpPr>
         <p:spPr>
           <a:xfrm>
             <a:off x="3033720" y="2160000"/>
-            <a:ext cx="494280" cy="360"/>
+            <a:ext cx="493920" cy="360"/>
           </a:xfrm>
           <a:prstGeom prst="bentConnector3">
             <a:avLst>
@@ -2306,14 +1942,14 @@
       </p:sp>
       <p:sp>
         <p:nvSpPr>
-          <p:cNvPr id="50" name="CustomShape 12"/>
+          <p:cNvPr id="48" name="CustomShape 12"/>
           <p:cNvSpPr/>
           <p:nvPr/>
         </p:nvSpPr>
         <p:spPr>
           <a:xfrm>
             <a:off x="6336000" y="1951560"/>
-            <a:ext cx="929160" cy="424440"/>
+            <a:ext cx="928800" cy="496440"/>
           </a:xfrm>
           <a:prstGeom prst="rect">
             <a:avLst/>
@@ -2332,7 +1968,7 @@
           <a:fontRef idx="minor"/>
         </p:style>
         <p:txBody>
-          <a:bodyPr tIns="91440" bIns="91440" anchor="ctr">
+          <a:bodyPr lIns="90000" rIns="90000" tIns="91440" bIns="91440" anchor="ctr">
             <a:noAutofit/>
           </a:bodyPr>
           <a:p>
@@ -2349,7 +1985,7 @@
                 <a:latin typeface="Arial"/>
                 <a:ea typeface="Arial"/>
               </a:rPr>
-              <a:t>Infrastructure as code security scan</a:t>
+              <a:t>Infrastructure as code security scan – Checkov.io</a:t>
             </a:r>
             <a:endParaRPr b="0" lang="pl-PL" sz="800" spc="-1" strike="noStrike">
               <a:latin typeface="Arial"/>
@@ -2359,14 +1995,14 @@
       </p:sp>
       <p:sp>
         <p:nvSpPr>
-          <p:cNvPr id="51" name="CustomShape 13"/>
+          <p:cNvPr id="49" name="CustomShape 13"/>
           <p:cNvSpPr/>
           <p:nvPr/>
         </p:nvSpPr>
         <p:spPr>
           <a:xfrm>
             <a:off x="5736600" y="2160000"/>
-            <a:ext cx="599400" cy="360"/>
+            <a:ext cx="599040" cy="360"/>
           </a:xfrm>
           <a:prstGeom prst="bentConnector3">
             <a:avLst>
@@ -2391,14 +2027,14 @@
       </p:sp>
       <p:sp>
         <p:nvSpPr>
-          <p:cNvPr id="52" name="CustomShape 14"/>
+          <p:cNvPr id="50" name="CustomShape 14"/>
           <p:cNvSpPr/>
           <p:nvPr/>
         </p:nvSpPr>
         <p:spPr>
           <a:xfrm>
             <a:off x="7704000" y="3031560"/>
-            <a:ext cx="1152000" cy="424440"/>
+            <a:ext cx="1151640" cy="424080"/>
           </a:xfrm>
           <a:prstGeom prst="rect">
             <a:avLst/>
@@ -2417,7 +2053,7 @@
           <a:fontRef idx="minor"/>
         </p:style>
         <p:txBody>
-          <a:bodyPr tIns="91440" bIns="91440" anchor="ctr">
+          <a:bodyPr lIns="90000" rIns="90000" tIns="91440" bIns="91440" anchor="ctr">
             <a:noAutofit/>
           </a:bodyPr>
           <a:p>
@@ -2434,7 +2070,7 @@
                 <a:latin typeface="Arial"/>
                 <a:ea typeface="Arial"/>
               </a:rPr>
-              <a:t>Post-deployment compliance scan</a:t>
+              <a:t>Post-deployment compliance scan - Prowler</a:t>
             </a:r>
             <a:endParaRPr b="0" lang="pl-PL" sz="800" spc="-1" strike="noStrike">
               <a:latin typeface="Arial"/>
@@ -2444,14 +2080,14 @@
       </p:sp>
       <p:sp>
         <p:nvSpPr>
-          <p:cNvPr id="53" name="CustomShape 15"/>
+          <p:cNvPr id="51" name="CustomShape 15"/>
           <p:cNvSpPr/>
           <p:nvPr/>
         </p:nvSpPr>
         <p:spPr>
           <a:xfrm>
             <a:off x="8208000" y="2448000"/>
-            <a:ext cx="360" cy="576000"/>
+            <a:ext cx="360" cy="575640"/>
           </a:xfrm>
           <a:prstGeom prst="bentConnector3">
             <a:avLst>

</xml_diff>